<commit_message>
write chapter 10:switch to tag
</commit_message>
<xml_diff>
--- a/pptx/chapter-10.pptx
+++ b/pptx/chapter-10.pptx
@@ -7,6 +7,10 @@
   <p:sldIdLst>
     <p:sldId id="256" r:id="rId2"/>
     <p:sldId id="257" r:id="rId3"/>
+    <p:sldId id="259" r:id="rId4"/>
+    <p:sldId id="260" r:id="rId5"/>
+    <p:sldId id="261" r:id="rId6"/>
+    <p:sldId id="262" r:id="rId7"/>
   </p:sldIdLst>
   <p:sldSz cx="9144000" cy="6858000" type="screen4x3"/>
   <p:notesSz cx="6858000" cy="9144000"/>
@@ -3358,6 +3362,1116 @@
 </p:sld>
 </file>
 
+<file path=ppt/slides/slide3.xml><?xml version="1.0" encoding="utf-8"?>
+<p:sld xmlns:a="http://schemas.openxmlformats.org/drawingml/2006/main" xmlns:r="http://schemas.openxmlformats.org/officeDocument/2006/relationships" xmlns:p="http://schemas.openxmlformats.org/presentationml/2006/main">
+  <p:cSld>
+    <p:spTree>
+      <p:nvGrpSpPr>
+        <p:cNvPr id="1" name=""/>
+        <p:cNvGrpSpPr/>
+        <p:nvPr/>
+      </p:nvGrpSpPr>
+      <p:grpSpPr>
+        <a:xfrm>
+          <a:off x="0" y="0"/>
+          <a:ext cx="0" cy="0"/>
+          <a:chOff x="0" y="0"/>
+          <a:chExt cx="0" cy="0"/>
+        </a:xfrm>
+      </p:grpSpPr>
+      <p:sp>
+        <p:nvSpPr>
+          <p:cNvPr id="3" name="正方形/長方形 2"/>
+          <p:cNvSpPr/>
+          <p:nvPr/>
+        </p:nvSpPr>
+        <p:spPr>
+          <a:xfrm>
+            <a:off x="852787" y="749346"/>
+            <a:ext cx="3652538" cy="3441654"/>
+          </a:xfrm>
+          <a:prstGeom prst="rect">
+            <a:avLst/>
+          </a:prstGeom>
+        </p:spPr>
+        <p:style>
+          <a:lnRef idx="1">
+            <a:schemeClr val="accent1"/>
+          </a:lnRef>
+          <a:fillRef idx="2">
+            <a:schemeClr val="accent1"/>
+          </a:fillRef>
+          <a:effectRef idx="1">
+            <a:schemeClr val="accent1"/>
+          </a:effectRef>
+          <a:fontRef idx="minor">
+            <a:schemeClr val="dk1"/>
+          </a:fontRef>
+        </p:style>
+        <p:txBody>
+          <a:bodyPr rtlCol="0" anchor="ctr"/>
+          <a:lstStyle/>
+          <a:p>
+            <a:pPr algn="ctr"/>
+            <a:endParaRPr kumimoji="1" lang="ja-JP" altLang="en-US"/>
+          </a:p>
+        </p:txBody>
+      </p:sp>
+      <p:sp>
+        <p:nvSpPr>
+          <p:cNvPr id="4" name="フローチャート: 磁気ディスク 3"/>
+          <p:cNvSpPr/>
+          <p:nvPr/>
+        </p:nvSpPr>
+        <p:spPr>
+          <a:xfrm>
+            <a:off x="322500" y="129426"/>
+            <a:ext cx="1536192" cy="890016"/>
+          </a:xfrm>
+          <a:prstGeom prst="flowChartMagneticDisk">
+            <a:avLst/>
+          </a:prstGeom>
+        </p:spPr>
+        <p:style>
+          <a:lnRef idx="1">
+            <a:schemeClr val="accent4"/>
+          </a:lnRef>
+          <a:fillRef idx="2">
+            <a:schemeClr val="accent4"/>
+          </a:fillRef>
+          <a:effectRef idx="1">
+            <a:schemeClr val="accent4"/>
+          </a:effectRef>
+          <a:fontRef idx="minor">
+            <a:schemeClr val="dk1"/>
+          </a:fontRef>
+        </p:style>
+        <p:txBody>
+          <a:bodyPr rtlCol="0" anchor="ctr"/>
+          <a:lstStyle/>
+          <a:p>
+            <a:pPr algn="ctr"/>
+            <a:r>
+              <a:rPr kumimoji="1" lang="ja-JP" altLang="en-US" dirty="0" smtClean="0"/>
+              <a:t>リポジトリー</a:t>
+            </a:r>
+            <a:endParaRPr kumimoji="1" lang="ja-JP" altLang="en-US" dirty="0"/>
+          </a:p>
+        </p:txBody>
+      </p:sp>
+      <p:pic>
+        <p:nvPicPr>
+          <p:cNvPr id="5" name="図 4"/>
+          <p:cNvPicPr>
+            <a:picLocks noChangeAspect="1"/>
+          </p:cNvPicPr>
+          <p:nvPr/>
+        </p:nvPicPr>
+        <p:blipFill>
+          <a:blip r:embed="rId2" cstate="print">
+            <a:extLst>
+              <a:ext uri="{28A0092B-C50C-407E-A947-70E740481C1C}">
+                <a14:useLocalDpi xmlns:a14="http://schemas.microsoft.com/office/drawing/2010/main" val="0"/>
+              </a:ext>
+            </a:extLst>
+          </a:blip>
+          <a:stretch>
+            <a:fillRect/>
+          </a:stretch>
+        </p:blipFill>
+        <p:spPr>
+          <a:xfrm>
+            <a:off x="1065002" y="1019442"/>
+            <a:ext cx="475374" cy="475374"/>
+          </a:xfrm>
+          <a:prstGeom prst="rect">
+            <a:avLst/>
+          </a:prstGeom>
+        </p:spPr>
+      </p:pic>
+      <p:sp>
+        <p:nvSpPr>
+          <p:cNvPr id="6" name="テキスト ボックス 5"/>
+          <p:cNvSpPr txBox="1"/>
+          <p:nvPr/>
+        </p:nvSpPr>
+        <p:spPr>
+          <a:xfrm>
+            <a:off x="1540376" y="1072463"/>
+            <a:ext cx="671466" cy="369332"/>
+          </a:xfrm>
+          <a:prstGeom prst="rect">
+            <a:avLst/>
+          </a:prstGeom>
+          <a:noFill/>
+        </p:spPr>
+        <p:txBody>
+          <a:bodyPr wrap="none" rtlCol="0">
+            <a:spAutoFit/>
+          </a:bodyPr>
+          <a:lstStyle/>
+          <a:p>
+            <a:r>
+              <a:rPr kumimoji="1" lang="en-US" altLang="ja-JP" dirty="0" smtClean="0"/>
+              <a:t>root/</a:t>
+            </a:r>
+            <a:endParaRPr kumimoji="1" lang="ja-JP" altLang="en-US" dirty="0"/>
+          </a:p>
+        </p:txBody>
+      </p:sp>
+      <p:pic>
+        <p:nvPicPr>
+          <p:cNvPr id="7" name="図 6"/>
+          <p:cNvPicPr>
+            <a:picLocks noChangeAspect="1"/>
+          </p:cNvPicPr>
+          <p:nvPr/>
+        </p:nvPicPr>
+        <p:blipFill>
+          <a:blip r:embed="rId2" cstate="print">
+            <a:extLst>
+              <a:ext uri="{28A0092B-C50C-407E-A947-70E740481C1C}">
+                <a14:useLocalDpi xmlns:a14="http://schemas.microsoft.com/office/drawing/2010/main" val="0"/>
+              </a:ext>
+            </a:extLst>
+          </a:blip>
+          <a:stretch>
+            <a:fillRect/>
+          </a:stretch>
+        </p:blipFill>
+        <p:spPr>
+          <a:xfrm>
+            <a:off x="1442954" y="1655666"/>
+            <a:ext cx="475374" cy="475374"/>
+          </a:xfrm>
+          <a:prstGeom prst="rect">
+            <a:avLst/>
+          </a:prstGeom>
+        </p:spPr>
+      </p:pic>
+      <p:sp>
+        <p:nvSpPr>
+          <p:cNvPr id="8" name="テキスト ボックス 7"/>
+          <p:cNvSpPr txBox="1"/>
+          <p:nvPr/>
+        </p:nvSpPr>
+        <p:spPr>
+          <a:xfrm>
+            <a:off x="1918328" y="1708687"/>
+            <a:ext cx="657937" cy="369332"/>
+          </a:xfrm>
+          <a:prstGeom prst="rect">
+            <a:avLst/>
+          </a:prstGeom>
+          <a:noFill/>
+        </p:spPr>
+        <p:txBody>
+          <a:bodyPr wrap="none" rtlCol="0">
+            <a:spAutoFit/>
+          </a:bodyPr>
+          <a:lstStyle/>
+          <a:p>
+            <a:r>
+              <a:rPr lang="en-US" altLang="ja-JP" dirty="0" smtClean="0"/>
+              <a:t>tags/</a:t>
+            </a:r>
+            <a:endParaRPr kumimoji="1" lang="ja-JP" altLang="en-US" dirty="0"/>
+          </a:p>
+        </p:txBody>
+      </p:sp>
+      <p:pic>
+        <p:nvPicPr>
+          <p:cNvPr id="9" name="図 8"/>
+          <p:cNvPicPr>
+            <a:picLocks noChangeAspect="1"/>
+          </p:cNvPicPr>
+          <p:nvPr/>
+        </p:nvPicPr>
+        <p:blipFill>
+          <a:blip r:embed="rId2" cstate="print">
+            <a:extLst>
+              <a:ext uri="{28A0092B-C50C-407E-A947-70E740481C1C}">
+                <a14:useLocalDpi xmlns:a14="http://schemas.microsoft.com/office/drawing/2010/main" val="0"/>
+              </a:ext>
+            </a:extLst>
+          </a:blip>
+          <a:stretch>
+            <a:fillRect/>
+          </a:stretch>
+        </p:blipFill>
+        <p:spPr>
+          <a:xfrm>
+            <a:off x="1442954" y="3451581"/>
+            <a:ext cx="475374" cy="475374"/>
+          </a:xfrm>
+          <a:prstGeom prst="rect">
+            <a:avLst/>
+          </a:prstGeom>
+        </p:spPr>
+      </p:pic>
+      <p:sp>
+        <p:nvSpPr>
+          <p:cNvPr id="10" name="テキスト ボックス 9"/>
+          <p:cNvSpPr txBox="1"/>
+          <p:nvPr/>
+        </p:nvSpPr>
+        <p:spPr>
+          <a:xfrm>
+            <a:off x="1918328" y="3504602"/>
+            <a:ext cx="779381" cy="369332"/>
+          </a:xfrm>
+          <a:prstGeom prst="rect">
+            <a:avLst/>
+          </a:prstGeom>
+          <a:noFill/>
+        </p:spPr>
+        <p:txBody>
+          <a:bodyPr wrap="none" rtlCol="0">
+            <a:spAutoFit/>
+          </a:bodyPr>
+          <a:lstStyle/>
+          <a:p>
+            <a:r>
+              <a:rPr lang="en-US" altLang="ja-JP" dirty="0" smtClean="0"/>
+              <a:t>trunk/</a:t>
+            </a:r>
+            <a:endParaRPr kumimoji="1" lang="ja-JP" altLang="en-US" dirty="0"/>
+          </a:p>
+        </p:txBody>
+      </p:sp>
+      <p:cxnSp>
+        <p:nvCxnSpPr>
+          <p:cNvPr id="11" name="カギ線コネクタ 10"/>
+          <p:cNvCxnSpPr>
+            <a:stCxn id="5" idx="2"/>
+            <a:endCxn id="7" idx="1"/>
+          </p:cNvCxnSpPr>
+          <p:nvPr/>
+        </p:nvCxnSpPr>
+        <p:spPr>
+          <a:xfrm rot="16200000" flipH="1">
+            <a:off x="1173553" y="1623951"/>
+            <a:ext cx="398537" cy="140265"/>
+          </a:xfrm>
+          <a:prstGeom prst="bentConnector2">
+            <a:avLst/>
+          </a:prstGeom>
+        </p:spPr>
+        <p:style>
+          <a:lnRef idx="1">
+            <a:schemeClr val="dk1"/>
+          </a:lnRef>
+          <a:fillRef idx="0">
+            <a:schemeClr val="dk1"/>
+          </a:fillRef>
+          <a:effectRef idx="0">
+            <a:schemeClr val="dk1"/>
+          </a:effectRef>
+          <a:fontRef idx="minor">
+            <a:schemeClr val="tx1"/>
+          </a:fontRef>
+        </p:style>
+      </p:cxnSp>
+      <p:cxnSp>
+        <p:nvCxnSpPr>
+          <p:cNvPr id="12" name="カギ線コネクタ 11"/>
+          <p:cNvCxnSpPr>
+            <a:stCxn id="5" idx="2"/>
+            <a:endCxn id="9" idx="1"/>
+          </p:cNvCxnSpPr>
+          <p:nvPr/>
+        </p:nvCxnSpPr>
+        <p:spPr>
+          <a:xfrm rot="16200000" flipH="1">
+            <a:off x="275595" y="2521909"/>
+            <a:ext cx="2194452" cy="140265"/>
+          </a:xfrm>
+          <a:prstGeom prst="bentConnector2">
+            <a:avLst/>
+          </a:prstGeom>
+        </p:spPr>
+        <p:style>
+          <a:lnRef idx="1">
+            <a:schemeClr val="dk1"/>
+          </a:lnRef>
+          <a:fillRef idx="0">
+            <a:schemeClr val="dk1"/>
+          </a:fillRef>
+          <a:effectRef idx="0">
+            <a:schemeClr val="dk1"/>
+          </a:effectRef>
+          <a:fontRef idx="minor">
+            <a:schemeClr val="tx1"/>
+          </a:fontRef>
+        </p:style>
+      </p:cxnSp>
+      <p:pic>
+        <p:nvPicPr>
+          <p:cNvPr id="14" name="図 13"/>
+          <p:cNvPicPr>
+            <a:picLocks noChangeAspect="1"/>
+          </p:cNvPicPr>
+          <p:nvPr/>
+        </p:nvPicPr>
+        <p:blipFill>
+          <a:blip r:embed="rId2" cstate="print">
+            <a:extLst>
+              <a:ext uri="{28A0092B-C50C-407E-A947-70E740481C1C}">
+                <a14:useLocalDpi xmlns:a14="http://schemas.microsoft.com/office/drawing/2010/main" val="0"/>
+              </a:ext>
+            </a:extLst>
+          </a:blip>
+          <a:stretch>
+            <a:fillRect/>
+          </a:stretch>
+        </p:blipFill>
+        <p:spPr>
+          <a:xfrm>
+            <a:off x="1973241" y="2239055"/>
+            <a:ext cx="475374" cy="475374"/>
+          </a:xfrm>
+          <a:prstGeom prst="rect">
+            <a:avLst/>
+          </a:prstGeom>
+        </p:spPr>
+      </p:pic>
+      <p:sp>
+        <p:nvSpPr>
+          <p:cNvPr id="15" name="テキスト ボックス 14"/>
+          <p:cNvSpPr txBox="1"/>
+          <p:nvPr/>
+        </p:nvSpPr>
+        <p:spPr>
+          <a:xfrm>
+            <a:off x="2448615" y="2292076"/>
+            <a:ext cx="951094" cy="369332"/>
+          </a:xfrm>
+          <a:prstGeom prst="rect">
+            <a:avLst/>
+          </a:prstGeom>
+          <a:noFill/>
+        </p:spPr>
+        <p:txBody>
+          <a:bodyPr wrap="none" rtlCol="0">
+            <a:spAutoFit/>
+          </a:bodyPr>
+          <a:lstStyle/>
+          <a:p>
+            <a:r>
+              <a:rPr lang="en-US" altLang="ja-JP" dirty="0" smtClean="0"/>
+              <a:t>release/</a:t>
+            </a:r>
+            <a:endParaRPr kumimoji="1" lang="ja-JP" altLang="en-US" dirty="0"/>
+          </a:p>
+        </p:txBody>
+      </p:sp>
+      <p:cxnSp>
+        <p:nvCxnSpPr>
+          <p:cNvPr id="16" name="カギ線コネクタ 15"/>
+          <p:cNvCxnSpPr>
+            <a:endCxn id="14" idx="1"/>
+          </p:cNvCxnSpPr>
+          <p:nvPr/>
+        </p:nvCxnSpPr>
+        <p:spPr>
+          <a:xfrm rot="16200000" flipH="1">
+            <a:off x="1676677" y="2180178"/>
+            <a:ext cx="321678" cy="271450"/>
+          </a:xfrm>
+          <a:prstGeom prst="bentConnector2">
+            <a:avLst/>
+          </a:prstGeom>
+        </p:spPr>
+        <p:style>
+          <a:lnRef idx="1">
+            <a:schemeClr val="dk1"/>
+          </a:lnRef>
+          <a:fillRef idx="0">
+            <a:schemeClr val="dk1"/>
+          </a:fillRef>
+          <a:effectRef idx="0">
+            <a:schemeClr val="dk1"/>
+          </a:effectRef>
+          <a:fontRef idx="minor">
+            <a:schemeClr val="tx1"/>
+          </a:fontRef>
+        </p:style>
+      </p:cxnSp>
+      <p:pic>
+        <p:nvPicPr>
+          <p:cNvPr id="20" name="図 19"/>
+          <p:cNvPicPr>
+            <a:picLocks noChangeAspect="1"/>
+          </p:cNvPicPr>
+          <p:nvPr/>
+        </p:nvPicPr>
+        <p:blipFill>
+          <a:blip r:embed="rId2" cstate="print">
+            <a:extLst>
+              <a:ext uri="{28A0092B-C50C-407E-A947-70E740481C1C}">
+                <a14:useLocalDpi xmlns:a14="http://schemas.microsoft.com/office/drawing/2010/main" val="0"/>
+              </a:ext>
+            </a:extLst>
+          </a:blip>
+          <a:stretch>
+            <a:fillRect/>
+          </a:stretch>
+        </p:blipFill>
+        <p:spPr>
+          <a:xfrm>
+            <a:off x="2503528" y="2724380"/>
+            <a:ext cx="475374" cy="475374"/>
+          </a:xfrm>
+          <a:prstGeom prst="rect">
+            <a:avLst/>
+          </a:prstGeom>
+        </p:spPr>
+      </p:pic>
+      <p:sp>
+        <p:nvSpPr>
+          <p:cNvPr id="21" name="テキスト ボックス 20"/>
+          <p:cNvSpPr txBox="1"/>
+          <p:nvPr/>
+        </p:nvSpPr>
+        <p:spPr>
+          <a:xfrm>
+            <a:off x="2978902" y="2777401"/>
+            <a:ext cx="670376" cy="369332"/>
+          </a:xfrm>
+          <a:prstGeom prst="rect">
+            <a:avLst/>
+          </a:prstGeom>
+          <a:noFill/>
+        </p:spPr>
+        <p:txBody>
+          <a:bodyPr wrap="none" rtlCol="0">
+            <a:spAutoFit/>
+          </a:bodyPr>
+          <a:lstStyle/>
+          <a:p>
+            <a:r>
+              <a:rPr lang="en-US" altLang="ja-JP" dirty="0" smtClean="0"/>
+              <a:t>v1.0/</a:t>
+            </a:r>
+            <a:endParaRPr kumimoji="1" lang="ja-JP" altLang="en-US" dirty="0"/>
+          </a:p>
+        </p:txBody>
+      </p:sp>
+      <p:cxnSp>
+        <p:nvCxnSpPr>
+          <p:cNvPr id="22" name="カギ線コネクタ 21"/>
+          <p:cNvCxnSpPr>
+            <a:stCxn id="14" idx="2"/>
+            <a:endCxn id="20" idx="1"/>
+          </p:cNvCxnSpPr>
+          <p:nvPr/>
+        </p:nvCxnSpPr>
+        <p:spPr>
+          <a:xfrm rot="16200000" flipH="1">
+            <a:off x="2233409" y="2691948"/>
+            <a:ext cx="247638" cy="292600"/>
+          </a:xfrm>
+          <a:prstGeom prst="bentConnector2">
+            <a:avLst/>
+          </a:prstGeom>
+        </p:spPr>
+        <p:style>
+          <a:lnRef idx="1">
+            <a:schemeClr val="dk1"/>
+          </a:lnRef>
+          <a:fillRef idx="0">
+            <a:schemeClr val="dk1"/>
+          </a:fillRef>
+          <a:effectRef idx="0">
+            <a:schemeClr val="dk1"/>
+          </a:effectRef>
+          <a:fontRef idx="minor">
+            <a:schemeClr val="tx1"/>
+          </a:fontRef>
+        </p:style>
+      </p:cxnSp>
+      <p:sp>
+        <p:nvSpPr>
+          <p:cNvPr id="26" name="正方形/長方形 25"/>
+          <p:cNvSpPr/>
+          <p:nvPr/>
+        </p:nvSpPr>
+        <p:spPr>
+          <a:xfrm>
+            <a:off x="5665515" y="3768351"/>
+            <a:ext cx="2523744" cy="2014728"/>
+          </a:xfrm>
+          <a:prstGeom prst="rect">
+            <a:avLst/>
+          </a:prstGeom>
+        </p:spPr>
+        <p:style>
+          <a:lnRef idx="1">
+            <a:schemeClr val="accent4"/>
+          </a:lnRef>
+          <a:fillRef idx="2">
+            <a:schemeClr val="accent4"/>
+          </a:fillRef>
+          <a:effectRef idx="1">
+            <a:schemeClr val="accent4"/>
+          </a:effectRef>
+          <a:fontRef idx="minor">
+            <a:schemeClr val="dk1"/>
+          </a:fontRef>
+        </p:style>
+        <p:txBody>
+          <a:bodyPr rtlCol="0" anchor="ctr"/>
+          <a:lstStyle/>
+          <a:p>
+            <a:pPr algn="ctr"/>
+            <a:endParaRPr kumimoji="1" lang="ja-JP" altLang="en-US" dirty="0"/>
+          </a:p>
+        </p:txBody>
+      </p:sp>
+      <p:pic>
+        <p:nvPicPr>
+          <p:cNvPr id="27" name="図 26"/>
+          <p:cNvPicPr>
+            <a:picLocks noChangeAspect="1"/>
+          </p:cNvPicPr>
+          <p:nvPr/>
+        </p:nvPicPr>
+        <p:blipFill>
+          <a:blip r:embed="rId2" cstate="print">
+            <a:extLst>
+              <a:ext uri="{28A0092B-C50C-407E-A947-70E740481C1C}">
+                <a14:useLocalDpi xmlns:a14="http://schemas.microsoft.com/office/drawing/2010/main" val="0"/>
+              </a:ext>
+            </a:extLst>
+          </a:blip>
+          <a:stretch>
+            <a:fillRect/>
+          </a:stretch>
+        </p:blipFill>
+        <p:spPr>
+          <a:xfrm>
+            <a:off x="5880318" y="4009200"/>
+            <a:ext cx="475374" cy="475374"/>
+          </a:xfrm>
+          <a:prstGeom prst="rect">
+            <a:avLst/>
+          </a:prstGeom>
+        </p:spPr>
+      </p:pic>
+      <p:sp>
+        <p:nvSpPr>
+          <p:cNvPr id="28" name="テキスト ボックス 27"/>
+          <p:cNvSpPr txBox="1"/>
+          <p:nvPr/>
+        </p:nvSpPr>
+        <p:spPr>
+          <a:xfrm>
+            <a:off x="6355692" y="4062221"/>
+            <a:ext cx="1203791" cy="369332"/>
+          </a:xfrm>
+          <a:prstGeom prst="rect">
+            <a:avLst/>
+          </a:prstGeom>
+          <a:noFill/>
+        </p:spPr>
+        <p:txBody>
+          <a:bodyPr wrap="none" rtlCol="0">
+            <a:spAutoFit/>
+          </a:bodyPr>
+          <a:lstStyle/>
+          <a:p>
+            <a:r>
+              <a:rPr lang="en-US" altLang="ja-JP" dirty="0" smtClean="0"/>
+              <a:t>d:\workdir</a:t>
+            </a:r>
+            <a:endParaRPr kumimoji="1" lang="ja-JP" altLang="en-US" dirty="0"/>
+          </a:p>
+        </p:txBody>
+      </p:sp>
+      <p:pic>
+        <p:nvPicPr>
+          <p:cNvPr id="29" name="図 28"/>
+          <p:cNvPicPr>
+            <a:picLocks noChangeAspect="1"/>
+          </p:cNvPicPr>
+          <p:nvPr/>
+        </p:nvPicPr>
+        <p:blipFill>
+          <a:blip r:embed="rId2" cstate="print">
+            <a:extLst>
+              <a:ext uri="{28A0092B-C50C-407E-A947-70E740481C1C}">
+                <a14:useLocalDpi xmlns:a14="http://schemas.microsoft.com/office/drawing/2010/main" val="0"/>
+              </a:ext>
+            </a:extLst>
+          </a:blip>
+          <a:stretch>
+            <a:fillRect/>
+          </a:stretch>
+        </p:blipFill>
+        <p:spPr>
+          <a:xfrm>
+            <a:off x="6258270" y="4645424"/>
+            <a:ext cx="475374" cy="475374"/>
+          </a:xfrm>
+          <a:prstGeom prst="rect">
+            <a:avLst/>
+          </a:prstGeom>
+        </p:spPr>
+      </p:pic>
+      <p:sp>
+        <p:nvSpPr>
+          <p:cNvPr id="30" name="テキスト ボックス 29"/>
+          <p:cNvSpPr txBox="1"/>
+          <p:nvPr/>
+        </p:nvSpPr>
+        <p:spPr>
+          <a:xfrm>
+            <a:off x="6733644" y="4698445"/>
+            <a:ext cx="643125" cy="369332"/>
+          </a:xfrm>
+          <a:prstGeom prst="rect">
+            <a:avLst/>
+          </a:prstGeom>
+          <a:noFill/>
+        </p:spPr>
+        <p:txBody>
+          <a:bodyPr wrap="none" rtlCol="0">
+            <a:spAutoFit/>
+          </a:bodyPr>
+          <a:lstStyle/>
+          <a:p>
+            <a:r>
+              <a:rPr lang="en-US" altLang="ja-JP" dirty="0" smtClean="0"/>
+              <a:t>\doc</a:t>
+            </a:r>
+            <a:endParaRPr kumimoji="1" lang="ja-JP" altLang="en-US" dirty="0"/>
+          </a:p>
+        </p:txBody>
+      </p:sp>
+      <p:pic>
+        <p:nvPicPr>
+          <p:cNvPr id="31" name="図 30"/>
+          <p:cNvPicPr>
+            <a:picLocks noChangeAspect="1"/>
+          </p:cNvPicPr>
+          <p:nvPr/>
+        </p:nvPicPr>
+        <p:blipFill>
+          <a:blip r:embed="rId2" cstate="print">
+            <a:extLst>
+              <a:ext uri="{28A0092B-C50C-407E-A947-70E740481C1C}">
+                <a14:useLocalDpi xmlns:a14="http://schemas.microsoft.com/office/drawing/2010/main" val="0"/>
+              </a:ext>
+            </a:extLst>
+          </a:blip>
+          <a:stretch>
+            <a:fillRect/>
+          </a:stretch>
+        </p:blipFill>
+        <p:spPr>
+          <a:xfrm>
+            <a:off x="6258270" y="5176981"/>
+            <a:ext cx="475374" cy="475374"/>
+          </a:xfrm>
+          <a:prstGeom prst="rect">
+            <a:avLst/>
+          </a:prstGeom>
+        </p:spPr>
+      </p:pic>
+      <p:sp>
+        <p:nvSpPr>
+          <p:cNvPr id="32" name="テキスト ボックス 31"/>
+          <p:cNvSpPr txBox="1"/>
+          <p:nvPr/>
+        </p:nvSpPr>
+        <p:spPr>
+          <a:xfrm>
+            <a:off x="6733644" y="5230002"/>
+            <a:ext cx="565989" cy="369332"/>
+          </a:xfrm>
+          <a:prstGeom prst="rect">
+            <a:avLst/>
+          </a:prstGeom>
+          <a:noFill/>
+        </p:spPr>
+        <p:txBody>
+          <a:bodyPr wrap="none" rtlCol="0">
+            <a:spAutoFit/>
+          </a:bodyPr>
+          <a:lstStyle/>
+          <a:p>
+            <a:r>
+              <a:rPr lang="en-US" altLang="ja-JP" dirty="0" smtClean="0"/>
+              <a:t>\</a:t>
+            </a:r>
+            <a:r>
+              <a:rPr lang="en-US" altLang="ja-JP" dirty="0" err="1" smtClean="0"/>
+              <a:t>src</a:t>
+            </a:r>
+            <a:endParaRPr kumimoji="1" lang="ja-JP" altLang="en-US" dirty="0"/>
+          </a:p>
+        </p:txBody>
+      </p:sp>
+      <p:cxnSp>
+        <p:nvCxnSpPr>
+          <p:cNvPr id="33" name="カギ線コネクタ 32"/>
+          <p:cNvCxnSpPr>
+            <a:stCxn id="27" idx="2"/>
+            <a:endCxn id="29" idx="1"/>
+          </p:cNvCxnSpPr>
+          <p:nvPr/>
+        </p:nvCxnSpPr>
+        <p:spPr>
+          <a:xfrm rot="16200000" flipH="1">
+            <a:off x="5988869" y="4613709"/>
+            <a:ext cx="398537" cy="140265"/>
+          </a:xfrm>
+          <a:prstGeom prst="bentConnector2">
+            <a:avLst/>
+          </a:prstGeom>
+        </p:spPr>
+        <p:style>
+          <a:lnRef idx="1">
+            <a:schemeClr val="dk1"/>
+          </a:lnRef>
+          <a:fillRef idx="0">
+            <a:schemeClr val="dk1"/>
+          </a:fillRef>
+          <a:effectRef idx="0">
+            <a:schemeClr val="dk1"/>
+          </a:effectRef>
+          <a:fontRef idx="minor">
+            <a:schemeClr val="tx1"/>
+          </a:fontRef>
+        </p:style>
+      </p:cxnSp>
+      <p:cxnSp>
+        <p:nvCxnSpPr>
+          <p:cNvPr id="34" name="カギ線コネクタ 33"/>
+          <p:cNvCxnSpPr>
+            <a:endCxn id="31" idx="1"/>
+          </p:cNvCxnSpPr>
+          <p:nvPr/>
+        </p:nvCxnSpPr>
+        <p:spPr>
+          <a:xfrm rot="16200000" flipH="1">
+            <a:off x="5751182" y="4907579"/>
+            <a:ext cx="873911" cy="140265"/>
+          </a:xfrm>
+          <a:prstGeom prst="bentConnector2">
+            <a:avLst/>
+          </a:prstGeom>
+        </p:spPr>
+        <p:style>
+          <a:lnRef idx="1">
+            <a:schemeClr val="dk1"/>
+          </a:lnRef>
+          <a:fillRef idx="0">
+            <a:schemeClr val="dk1"/>
+          </a:fillRef>
+          <a:effectRef idx="0">
+            <a:schemeClr val="dk1"/>
+          </a:effectRef>
+          <a:fontRef idx="minor">
+            <a:schemeClr val="tx1"/>
+          </a:fontRef>
+        </p:style>
+      </p:cxnSp>
+      <p:cxnSp>
+        <p:nvCxnSpPr>
+          <p:cNvPr id="44" name="カギ線コネクタ 43"/>
+          <p:cNvCxnSpPr>
+            <a:stCxn id="27" idx="1"/>
+            <a:endCxn id="10" idx="2"/>
+          </p:cNvCxnSpPr>
+          <p:nvPr/>
+        </p:nvCxnSpPr>
+        <p:spPr>
+          <a:xfrm rot="10800000">
+            <a:off x="2308020" y="3873935"/>
+            <a:ext cx="3572299" cy="372953"/>
+          </a:xfrm>
+          <a:prstGeom prst="bentConnector2">
+            <a:avLst/>
+          </a:prstGeom>
+          <a:ln>
+            <a:prstDash val="dash"/>
+            <a:tailEnd type="triangle"/>
+          </a:ln>
+        </p:spPr>
+        <p:style>
+          <a:lnRef idx="3">
+            <a:schemeClr val="dk1"/>
+          </a:lnRef>
+          <a:fillRef idx="0">
+            <a:schemeClr val="dk1"/>
+          </a:fillRef>
+          <a:effectRef idx="2">
+            <a:schemeClr val="dk1"/>
+          </a:effectRef>
+          <a:fontRef idx="minor">
+            <a:schemeClr val="tx1"/>
+          </a:fontRef>
+        </p:style>
+      </p:cxnSp>
+      <p:cxnSp>
+        <p:nvCxnSpPr>
+          <p:cNvPr id="47" name="カギ線コネクタ 46"/>
+          <p:cNvCxnSpPr>
+            <a:stCxn id="27" idx="0"/>
+            <a:endCxn id="21" idx="2"/>
+          </p:cNvCxnSpPr>
+          <p:nvPr/>
+        </p:nvCxnSpPr>
+        <p:spPr>
+          <a:xfrm rot="16200000" flipV="1">
+            <a:off x="4284815" y="2176009"/>
+            <a:ext cx="862467" cy="2803915"/>
+          </a:xfrm>
+          <a:prstGeom prst="bentConnector3">
+            <a:avLst>
+              <a:gd name="adj1" fmla="val 50000"/>
+            </a:avLst>
+          </a:prstGeom>
+          <a:ln>
+            <a:tailEnd type="triangle"/>
+          </a:ln>
+        </p:spPr>
+        <p:style>
+          <a:lnRef idx="3">
+            <a:schemeClr val="dk1"/>
+          </a:lnRef>
+          <a:fillRef idx="0">
+            <a:schemeClr val="dk1"/>
+          </a:fillRef>
+          <a:effectRef idx="2">
+            <a:schemeClr val="dk1"/>
+          </a:effectRef>
+          <a:fontRef idx="minor">
+            <a:schemeClr val="tx1"/>
+          </a:fontRef>
+        </p:style>
+      </p:cxnSp>
+      <p:sp>
+        <p:nvSpPr>
+          <p:cNvPr id="49" name="上矢印 48"/>
+          <p:cNvSpPr/>
+          <p:nvPr/>
+        </p:nvSpPr>
+        <p:spPr>
+          <a:xfrm>
+            <a:off x="3436830" y="3636250"/>
+            <a:ext cx="1628993" cy="554749"/>
+          </a:xfrm>
+          <a:prstGeom prst="upArrow">
+            <a:avLst>
+              <a:gd name="adj1" fmla="val 68400"/>
+              <a:gd name="adj2" fmla="val 55558"/>
+            </a:avLst>
+          </a:prstGeom>
+        </p:spPr>
+        <p:style>
+          <a:lnRef idx="2">
+            <a:schemeClr val="dk1"/>
+          </a:lnRef>
+          <a:fillRef idx="1">
+            <a:schemeClr val="lt1"/>
+          </a:fillRef>
+          <a:effectRef idx="0">
+            <a:schemeClr val="dk1"/>
+          </a:effectRef>
+          <a:fontRef idx="minor">
+            <a:schemeClr val="dk1"/>
+          </a:fontRef>
+        </p:style>
+        <p:txBody>
+          <a:bodyPr rtlCol="0" anchor="ctr"/>
+          <a:lstStyle/>
+          <a:p>
+            <a:pPr algn="ctr"/>
+            <a:r>
+              <a:rPr kumimoji="1" lang="ja-JP" altLang="en-US" dirty="0" smtClean="0"/>
+              <a:t>切り替え</a:t>
+            </a:r>
+            <a:endParaRPr kumimoji="1" lang="ja-JP" altLang="en-US" dirty="0"/>
+          </a:p>
+        </p:txBody>
+      </p:sp>
+    </p:spTree>
+    <p:extLst>
+      <p:ext uri="{BB962C8B-B14F-4D97-AF65-F5344CB8AC3E}">
+        <p14:creationId xmlns:p14="http://schemas.microsoft.com/office/powerpoint/2010/main" val="3769559454"/>
+      </p:ext>
+    </p:extLst>
+  </p:cSld>
+  <p:clrMapOvr>
+    <a:masterClrMapping/>
+  </p:clrMapOvr>
+</p:sld>
+</file>
+
+<file path=ppt/slides/slide4.xml><?xml version="1.0" encoding="utf-8"?>
+<p:sld xmlns:a="http://schemas.openxmlformats.org/drawingml/2006/main" xmlns:r="http://schemas.openxmlformats.org/officeDocument/2006/relationships" xmlns:p="http://schemas.openxmlformats.org/presentationml/2006/main">
+  <p:cSld>
+    <p:spTree>
+      <p:nvGrpSpPr>
+        <p:cNvPr id="1" name=""/>
+        <p:cNvGrpSpPr/>
+        <p:nvPr/>
+      </p:nvGrpSpPr>
+      <p:grpSpPr>
+        <a:xfrm>
+          <a:off x="0" y="0"/>
+          <a:ext cx="0" cy="0"/>
+          <a:chOff x="0" y="0"/>
+          <a:chExt cx="0" cy="0"/>
+        </a:xfrm>
+      </p:grpSpPr>
+      <p:pic>
+        <p:nvPicPr>
+          <p:cNvPr id="2" name="図 1"/>
+          <p:cNvPicPr>
+            <a:picLocks noChangeAspect="1"/>
+          </p:cNvPicPr>
+          <p:nvPr/>
+        </p:nvPicPr>
+        <p:blipFill>
+          <a:blip r:embed="rId2"/>
+          <a:stretch>
+            <a:fillRect/>
+          </a:stretch>
+        </p:blipFill>
+        <p:spPr>
+          <a:xfrm>
+            <a:off x="248190" y="2248047"/>
+            <a:ext cx="8647619" cy="2361905"/>
+          </a:xfrm>
+          <a:prstGeom prst="rect">
+            <a:avLst/>
+          </a:prstGeom>
+        </p:spPr>
+      </p:pic>
+    </p:spTree>
+    <p:extLst>
+      <p:ext uri="{BB962C8B-B14F-4D97-AF65-F5344CB8AC3E}">
+        <p14:creationId xmlns:p14="http://schemas.microsoft.com/office/powerpoint/2010/main" val="920120936"/>
+      </p:ext>
+    </p:extLst>
+  </p:cSld>
+  <p:clrMapOvr>
+    <a:masterClrMapping/>
+  </p:clrMapOvr>
+</p:sld>
+</file>
+
+<file path=ppt/slides/slide5.xml><?xml version="1.0" encoding="utf-8"?>
+<p:sld xmlns:a="http://schemas.openxmlformats.org/drawingml/2006/main" xmlns:r="http://schemas.openxmlformats.org/officeDocument/2006/relationships" xmlns:p="http://schemas.openxmlformats.org/presentationml/2006/main">
+  <p:cSld>
+    <p:spTree>
+      <p:nvGrpSpPr>
+        <p:cNvPr id="1" name=""/>
+        <p:cNvGrpSpPr/>
+        <p:nvPr/>
+      </p:nvGrpSpPr>
+      <p:grpSpPr>
+        <a:xfrm>
+          <a:off x="0" y="0"/>
+          <a:ext cx="0" cy="0"/>
+          <a:chOff x="0" y="0"/>
+          <a:chExt cx="0" cy="0"/>
+        </a:xfrm>
+      </p:grpSpPr>
+      <p:pic>
+        <p:nvPicPr>
+          <p:cNvPr id="2" name="図 1"/>
+          <p:cNvPicPr>
+            <a:picLocks noChangeAspect="1"/>
+          </p:cNvPicPr>
+          <p:nvPr/>
+        </p:nvPicPr>
+        <p:blipFill>
+          <a:blip r:embed="rId2"/>
+          <a:stretch>
+            <a:fillRect/>
+          </a:stretch>
+        </p:blipFill>
+        <p:spPr>
+          <a:xfrm>
+            <a:off x="1985962" y="1852612"/>
+            <a:ext cx="5172075" cy="3152775"/>
+          </a:xfrm>
+          <a:prstGeom prst="rect">
+            <a:avLst/>
+          </a:prstGeom>
+        </p:spPr>
+      </p:pic>
+    </p:spTree>
+    <p:extLst>
+      <p:ext uri="{BB962C8B-B14F-4D97-AF65-F5344CB8AC3E}">
+        <p14:creationId xmlns:p14="http://schemas.microsoft.com/office/powerpoint/2010/main" val="3293530746"/>
+      </p:ext>
+    </p:extLst>
+  </p:cSld>
+  <p:clrMapOvr>
+    <a:masterClrMapping/>
+  </p:clrMapOvr>
+</p:sld>
+</file>
+
+<file path=ppt/slides/slide6.xml><?xml version="1.0" encoding="utf-8"?>
+<p:sld xmlns:a="http://schemas.openxmlformats.org/drawingml/2006/main" xmlns:r="http://schemas.openxmlformats.org/officeDocument/2006/relationships" xmlns:p="http://schemas.openxmlformats.org/presentationml/2006/main">
+  <p:cSld>
+    <p:spTree>
+      <p:nvGrpSpPr>
+        <p:cNvPr id="1" name=""/>
+        <p:cNvGrpSpPr/>
+        <p:nvPr/>
+      </p:nvGrpSpPr>
+      <p:grpSpPr>
+        <a:xfrm>
+          <a:off x="0" y="0"/>
+          <a:ext cx="0" cy="0"/>
+          <a:chOff x="0" y="0"/>
+          <a:chExt cx="0" cy="0"/>
+        </a:xfrm>
+      </p:grpSpPr>
+      <p:pic>
+        <p:nvPicPr>
+          <p:cNvPr id="2" name="図 1"/>
+          <p:cNvPicPr>
+            <a:picLocks noChangeAspect="1"/>
+          </p:cNvPicPr>
+          <p:nvPr/>
+        </p:nvPicPr>
+        <p:blipFill>
+          <a:blip r:embed="rId2"/>
+          <a:stretch>
+            <a:fillRect/>
+          </a:stretch>
+        </p:blipFill>
+        <p:spPr>
+          <a:xfrm>
+            <a:off x="1395412" y="1971675"/>
+            <a:ext cx="6353175" cy="2914650"/>
+          </a:xfrm>
+          <a:prstGeom prst="rect">
+            <a:avLst/>
+          </a:prstGeom>
+        </p:spPr>
+      </p:pic>
+    </p:spTree>
+    <p:extLst>
+      <p:ext uri="{BB962C8B-B14F-4D97-AF65-F5344CB8AC3E}">
+        <p14:creationId xmlns:p14="http://schemas.microsoft.com/office/powerpoint/2010/main" val="164417414"/>
+      </p:ext>
+    </p:extLst>
+  </p:cSld>
+  <p:clrMapOvr>
+    <a:masterClrMapping/>
+  </p:clrMapOvr>
+</p:sld>
+</file>
+
 <file path=ppt/theme/theme1.xml><?xml version="1.0" encoding="utf-8"?>
 <a:theme xmlns:a="http://schemas.openxmlformats.org/drawingml/2006/main" name="Office テーマ">
   <a:themeElements>

</xml_diff>

<commit_message>
write chapter 10:switch and export tag
</commit_message>
<xml_diff>
--- a/pptx/chapter-10.pptx
+++ b/pptx/chapter-10.pptx
@@ -11,6 +11,10 @@
     <p:sldId id="260" r:id="rId5"/>
     <p:sldId id="261" r:id="rId6"/>
     <p:sldId id="262" r:id="rId7"/>
+    <p:sldId id="263" r:id="rId8"/>
+    <p:sldId id="264" r:id="rId9"/>
+    <p:sldId id="265" r:id="rId10"/>
+    <p:sldId id="266" r:id="rId11"/>
   </p:sldIdLst>
   <p:sldSz cx="9144000" cy="6858000" type="screen4x3"/>
   <p:notesSz cx="6858000" cy="9144000"/>
@@ -3308,6 +3312,60 @@
 </p:sld>
 </file>
 
+<file path=ppt/slides/slide10.xml><?xml version="1.0" encoding="utf-8"?>
+<p:sld xmlns:a="http://schemas.openxmlformats.org/drawingml/2006/main" xmlns:r="http://schemas.openxmlformats.org/officeDocument/2006/relationships" xmlns:p="http://schemas.openxmlformats.org/presentationml/2006/main">
+  <p:cSld>
+    <p:spTree>
+      <p:nvGrpSpPr>
+        <p:cNvPr id="1" name=""/>
+        <p:cNvGrpSpPr/>
+        <p:nvPr/>
+      </p:nvGrpSpPr>
+      <p:grpSpPr>
+        <a:xfrm>
+          <a:off x="0" y="0"/>
+          <a:ext cx="0" cy="0"/>
+          <a:chOff x="0" y="0"/>
+          <a:chExt cx="0" cy="0"/>
+        </a:xfrm>
+      </p:grpSpPr>
+      <p:pic>
+        <p:nvPicPr>
+          <p:cNvPr id="2" name="図 1"/>
+          <p:cNvPicPr>
+            <a:picLocks noChangeAspect="1"/>
+          </p:cNvPicPr>
+          <p:nvPr/>
+        </p:nvPicPr>
+        <p:blipFill>
+          <a:blip r:embed="rId2"/>
+          <a:stretch>
+            <a:fillRect/>
+          </a:stretch>
+        </p:blipFill>
+        <p:spPr>
+          <a:xfrm>
+            <a:off x="1395412" y="1971675"/>
+            <a:ext cx="6353175" cy="2914650"/>
+          </a:xfrm>
+          <a:prstGeom prst="rect">
+            <a:avLst/>
+          </a:prstGeom>
+        </p:spPr>
+      </p:pic>
+    </p:spTree>
+    <p:extLst>
+      <p:ext uri="{BB962C8B-B14F-4D97-AF65-F5344CB8AC3E}">
+        <p14:creationId xmlns:p14="http://schemas.microsoft.com/office/powerpoint/2010/main" val="4116524417"/>
+      </p:ext>
+    </p:extLst>
+  </p:cSld>
+  <p:clrMapOvr>
+    <a:masterClrMapping/>
+  </p:clrMapOvr>
+</p:sld>
+</file>
+
 <file path=ppt/slides/slide2.xml><?xml version="1.0" encoding="utf-8"?>
 <p:sld xmlns:a="http://schemas.openxmlformats.org/drawingml/2006/main" xmlns:r="http://schemas.openxmlformats.org/officeDocument/2006/relationships" xmlns:p="http://schemas.openxmlformats.org/presentationml/2006/main">
   <p:cSld>
@@ -4463,6 +4521,988 @@
     <p:extLst>
       <p:ext uri="{BB962C8B-B14F-4D97-AF65-F5344CB8AC3E}">
         <p14:creationId xmlns:p14="http://schemas.microsoft.com/office/powerpoint/2010/main" val="164417414"/>
+      </p:ext>
+    </p:extLst>
+  </p:cSld>
+  <p:clrMapOvr>
+    <a:masterClrMapping/>
+  </p:clrMapOvr>
+</p:sld>
+</file>
+
+<file path=ppt/slides/slide7.xml><?xml version="1.0" encoding="utf-8"?>
+<p:sld xmlns:a="http://schemas.openxmlformats.org/drawingml/2006/main" xmlns:r="http://schemas.openxmlformats.org/officeDocument/2006/relationships" xmlns:p="http://schemas.openxmlformats.org/presentationml/2006/main">
+  <p:cSld>
+    <p:spTree>
+      <p:nvGrpSpPr>
+        <p:cNvPr id="1" name=""/>
+        <p:cNvGrpSpPr/>
+        <p:nvPr/>
+      </p:nvGrpSpPr>
+      <p:grpSpPr>
+        <a:xfrm>
+          <a:off x="0" y="0"/>
+          <a:ext cx="0" cy="0"/>
+          <a:chOff x="0" y="0"/>
+          <a:chExt cx="0" cy="0"/>
+        </a:xfrm>
+      </p:grpSpPr>
+      <p:sp>
+        <p:nvSpPr>
+          <p:cNvPr id="3" name="正方形/長方形 2"/>
+          <p:cNvSpPr/>
+          <p:nvPr/>
+        </p:nvSpPr>
+        <p:spPr>
+          <a:xfrm>
+            <a:off x="852787" y="749346"/>
+            <a:ext cx="3652538" cy="3441654"/>
+          </a:xfrm>
+          <a:prstGeom prst="rect">
+            <a:avLst/>
+          </a:prstGeom>
+        </p:spPr>
+        <p:style>
+          <a:lnRef idx="1">
+            <a:schemeClr val="accent1"/>
+          </a:lnRef>
+          <a:fillRef idx="2">
+            <a:schemeClr val="accent1"/>
+          </a:fillRef>
+          <a:effectRef idx="1">
+            <a:schemeClr val="accent1"/>
+          </a:effectRef>
+          <a:fontRef idx="minor">
+            <a:schemeClr val="dk1"/>
+          </a:fontRef>
+        </p:style>
+        <p:txBody>
+          <a:bodyPr rtlCol="0" anchor="ctr"/>
+          <a:lstStyle/>
+          <a:p>
+            <a:pPr algn="ctr"/>
+            <a:endParaRPr kumimoji="1" lang="ja-JP" altLang="en-US"/>
+          </a:p>
+        </p:txBody>
+      </p:sp>
+      <p:sp>
+        <p:nvSpPr>
+          <p:cNvPr id="4" name="フローチャート: 磁気ディスク 3"/>
+          <p:cNvSpPr/>
+          <p:nvPr/>
+        </p:nvSpPr>
+        <p:spPr>
+          <a:xfrm>
+            <a:off x="322500" y="129426"/>
+            <a:ext cx="1536192" cy="890016"/>
+          </a:xfrm>
+          <a:prstGeom prst="flowChartMagneticDisk">
+            <a:avLst/>
+          </a:prstGeom>
+        </p:spPr>
+        <p:style>
+          <a:lnRef idx="1">
+            <a:schemeClr val="accent4"/>
+          </a:lnRef>
+          <a:fillRef idx="2">
+            <a:schemeClr val="accent4"/>
+          </a:fillRef>
+          <a:effectRef idx="1">
+            <a:schemeClr val="accent4"/>
+          </a:effectRef>
+          <a:fontRef idx="minor">
+            <a:schemeClr val="dk1"/>
+          </a:fontRef>
+        </p:style>
+        <p:txBody>
+          <a:bodyPr rtlCol="0" anchor="ctr"/>
+          <a:lstStyle/>
+          <a:p>
+            <a:pPr algn="ctr"/>
+            <a:r>
+              <a:rPr kumimoji="1" lang="ja-JP" altLang="en-US" dirty="0" smtClean="0"/>
+              <a:t>リポジトリー</a:t>
+            </a:r>
+            <a:endParaRPr kumimoji="1" lang="ja-JP" altLang="en-US" dirty="0"/>
+          </a:p>
+        </p:txBody>
+      </p:sp>
+      <p:pic>
+        <p:nvPicPr>
+          <p:cNvPr id="5" name="図 4"/>
+          <p:cNvPicPr>
+            <a:picLocks noChangeAspect="1"/>
+          </p:cNvPicPr>
+          <p:nvPr/>
+        </p:nvPicPr>
+        <p:blipFill>
+          <a:blip r:embed="rId2" cstate="print">
+            <a:extLst>
+              <a:ext uri="{28A0092B-C50C-407E-A947-70E740481C1C}">
+                <a14:useLocalDpi xmlns:a14="http://schemas.microsoft.com/office/drawing/2010/main" val="0"/>
+              </a:ext>
+            </a:extLst>
+          </a:blip>
+          <a:stretch>
+            <a:fillRect/>
+          </a:stretch>
+        </p:blipFill>
+        <p:spPr>
+          <a:xfrm>
+            <a:off x="1065002" y="1019442"/>
+            <a:ext cx="475374" cy="475374"/>
+          </a:xfrm>
+          <a:prstGeom prst="rect">
+            <a:avLst/>
+          </a:prstGeom>
+        </p:spPr>
+      </p:pic>
+      <p:sp>
+        <p:nvSpPr>
+          <p:cNvPr id="6" name="テキスト ボックス 5"/>
+          <p:cNvSpPr txBox="1"/>
+          <p:nvPr/>
+        </p:nvSpPr>
+        <p:spPr>
+          <a:xfrm>
+            <a:off x="1540376" y="1072463"/>
+            <a:ext cx="671466" cy="369332"/>
+          </a:xfrm>
+          <a:prstGeom prst="rect">
+            <a:avLst/>
+          </a:prstGeom>
+          <a:noFill/>
+        </p:spPr>
+        <p:txBody>
+          <a:bodyPr wrap="none" rtlCol="0">
+            <a:spAutoFit/>
+          </a:bodyPr>
+          <a:lstStyle/>
+          <a:p>
+            <a:r>
+              <a:rPr kumimoji="1" lang="en-US" altLang="ja-JP" dirty="0" smtClean="0"/>
+              <a:t>root/</a:t>
+            </a:r>
+            <a:endParaRPr kumimoji="1" lang="ja-JP" altLang="en-US" dirty="0"/>
+          </a:p>
+        </p:txBody>
+      </p:sp>
+      <p:pic>
+        <p:nvPicPr>
+          <p:cNvPr id="7" name="図 6"/>
+          <p:cNvPicPr>
+            <a:picLocks noChangeAspect="1"/>
+          </p:cNvPicPr>
+          <p:nvPr/>
+        </p:nvPicPr>
+        <p:blipFill>
+          <a:blip r:embed="rId2" cstate="print">
+            <a:extLst>
+              <a:ext uri="{28A0092B-C50C-407E-A947-70E740481C1C}">
+                <a14:useLocalDpi xmlns:a14="http://schemas.microsoft.com/office/drawing/2010/main" val="0"/>
+              </a:ext>
+            </a:extLst>
+          </a:blip>
+          <a:stretch>
+            <a:fillRect/>
+          </a:stretch>
+        </p:blipFill>
+        <p:spPr>
+          <a:xfrm>
+            <a:off x="1442954" y="1655666"/>
+            <a:ext cx="475374" cy="475374"/>
+          </a:xfrm>
+          <a:prstGeom prst="rect">
+            <a:avLst/>
+          </a:prstGeom>
+        </p:spPr>
+      </p:pic>
+      <p:sp>
+        <p:nvSpPr>
+          <p:cNvPr id="8" name="テキスト ボックス 7"/>
+          <p:cNvSpPr txBox="1"/>
+          <p:nvPr/>
+        </p:nvSpPr>
+        <p:spPr>
+          <a:xfrm>
+            <a:off x="1918328" y="1708687"/>
+            <a:ext cx="657937" cy="369332"/>
+          </a:xfrm>
+          <a:prstGeom prst="rect">
+            <a:avLst/>
+          </a:prstGeom>
+          <a:noFill/>
+        </p:spPr>
+        <p:txBody>
+          <a:bodyPr wrap="none" rtlCol="0">
+            <a:spAutoFit/>
+          </a:bodyPr>
+          <a:lstStyle/>
+          <a:p>
+            <a:r>
+              <a:rPr lang="en-US" altLang="ja-JP" dirty="0" smtClean="0"/>
+              <a:t>tags/</a:t>
+            </a:r>
+            <a:endParaRPr kumimoji="1" lang="ja-JP" altLang="en-US" dirty="0"/>
+          </a:p>
+        </p:txBody>
+      </p:sp>
+      <p:pic>
+        <p:nvPicPr>
+          <p:cNvPr id="9" name="図 8"/>
+          <p:cNvPicPr>
+            <a:picLocks noChangeAspect="1"/>
+          </p:cNvPicPr>
+          <p:nvPr/>
+        </p:nvPicPr>
+        <p:blipFill>
+          <a:blip r:embed="rId2" cstate="print">
+            <a:extLst>
+              <a:ext uri="{28A0092B-C50C-407E-A947-70E740481C1C}">
+                <a14:useLocalDpi xmlns:a14="http://schemas.microsoft.com/office/drawing/2010/main" val="0"/>
+              </a:ext>
+            </a:extLst>
+          </a:blip>
+          <a:stretch>
+            <a:fillRect/>
+          </a:stretch>
+        </p:blipFill>
+        <p:spPr>
+          <a:xfrm>
+            <a:off x="1442954" y="3451581"/>
+            <a:ext cx="475374" cy="475374"/>
+          </a:xfrm>
+          <a:prstGeom prst="rect">
+            <a:avLst/>
+          </a:prstGeom>
+        </p:spPr>
+      </p:pic>
+      <p:sp>
+        <p:nvSpPr>
+          <p:cNvPr id="10" name="テキスト ボックス 9"/>
+          <p:cNvSpPr txBox="1"/>
+          <p:nvPr/>
+        </p:nvSpPr>
+        <p:spPr>
+          <a:xfrm>
+            <a:off x="1918328" y="3504602"/>
+            <a:ext cx="779381" cy="369332"/>
+          </a:xfrm>
+          <a:prstGeom prst="rect">
+            <a:avLst/>
+          </a:prstGeom>
+          <a:noFill/>
+        </p:spPr>
+        <p:txBody>
+          <a:bodyPr wrap="none" rtlCol="0">
+            <a:spAutoFit/>
+          </a:bodyPr>
+          <a:lstStyle/>
+          <a:p>
+            <a:r>
+              <a:rPr lang="en-US" altLang="ja-JP" dirty="0" smtClean="0"/>
+              <a:t>trunk/</a:t>
+            </a:r>
+            <a:endParaRPr kumimoji="1" lang="ja-JP" altLang="en-US" dirty="0"/>
+          </a:p>
+        </p:txBody>
+      </p:sp>
+      <p:cxnSp>
+        <p:nvCxnSpPr>
+          <p:cNvPr id="11" name="カギ線コネクタ 10"/>
+          <p:cNvCxnSpPr>
+            <a:stCxn id="5" idx="2"/>
+            <a:endCxn id="7" idx="1"/>
+          </p:cNvCxnSpPr>
+          <p:nvPr/>
+        </p:nvCxnSpPr>
+        <p:spPr>
+          <a:xfrm rot="16200000" flipH="1">
+            <a:off x="1173553" y="1623951"/>
+            <a:ext cx="398537" cy="140265"/>
+          </a:xfrm>
+          <a:prstGeom prst="bentConnector2">
+            <a:avLst/>
+          </a:prstGeom>
+        </p:spPr>
+        <p:style>
+          <a:lnRef idx="1">
+            <a:schemeClr val="dk1"/>
+          </a:lnRef>
+          <a:fillRef idx="0">
+            <a:schemeClr val="dk1"/>
+          </a:fillRef>
+          <a:effectRef idx="0">
+            <a:schemeClr val="dk1"/>
+          </a:effectRef>
+          <a:fontRef idx="minor">
+            <a:schemeClr val="tx1"/>
+          </a:fontRef>
+        </p:style>
+      </p:cxnSp>
+      <p:cxnSp>
+        <p:nvCxnSpPr>
+          <p:cNvPr id="12" name="カギ線コネクタ 11"/>
+          <p:cNvCxnSpPr>
+            <a:stCxn id="5" idx="2"/>
+            <a:endCxn id="9" idx="1"/>
+          </p:cNvCxnSpPr>
+          <p:nvPr/>
+        </p:nvCxnSpPr>
+        <p:spPr>
+          <a:xfrm rot="16200000" flipH="1">
+            <a:off x="275595" y="2521909"/>
+            <a:ext cx="2194452" cy="140265"/>
+          </a:xfrm>
+          <a:prstGeom prst="bentConnector2">
+            <a:avLst/>
+          </a:prstGeom>
+        </p:spPr>
+        <p:style>
+          <a:lnRef idx="1">
+            <a:schemeClr val="dk1"/>
+          </a:lnRef>
+          <a:fillRef idx="0">
+            <a:schemeClr val="dk1"/>
+          </a:fillRef>
+          <a:effectRef idx="0">
+            <a:schemeClr val="dk1"/>
+          </a:effectRef>
+          <a:fontRef idx="minor">
+            <a:schemeClr val="tx1"/>
+          </a:fontRef>
+        </p:style>
+      </p:cxnSp>
+      <p:pic>
+        <p:nvPicPr>
+          <p:cNvPr id="14" name="図 13"/>
+          <p:cNvPicPr>
+            <a:picLocks noChangeAspect="1"/>
+          </p:cNvPicPr>
+          <p:nvPr/>
+        </p:nvPicPr>
+        <p:blipFill>
+          <a:blip r:embed="rId2" cstate="print">
+            <a:extLst>
+              <a:ext uri="{28A0092B-C50C-407E-A947-70E740481C1C}">
+                <a14:useLocalDpi xmlns:a14="http://schemas.microsoft.com/office/drawing/2010/main" val="0"/>
+              </a:ext>
+            </a:extLst>
+          </a:blip>
+          <a:stretch>
+            <a:fillRect/>
+          </a:stretch>
+        </p:blipFill>
+        <p:spPr>
+          <a:xfrm>
+            <a:off x="1973241" y="2239055"/>
+            <a:ext cx="475374" cy="475374"/>
+          </a:xfrm>
+          <a:prstGeom prst="rect">
+            <a:avLst/>
+          </a:prstGeom>
+        </p:spPr>
+      </p:pic>
+      <p:sp>
+        <p:nvSpPr>
+          <p:cNvPr id="15" name="テキスト ボックス 14"/>
+          <p:cNvSpPr txBox="1"/>
+          <p:nvPr/>
+        </p:nvSpPr>
+        <p:spPr>
+          <a:xfrm>
+            <a:off x="2448615" y="2292076"/>
+            <a:ext cx="951094" cy="369332"/>
+          </a:xfrm>
+          <a:prstGeom prst="rect">
+            <a:avLst/>
+          </a:prstGeom>
+          <a:noFill/>
+        </p:spPr>
+        <p:txBody>
+          <a:bodyPr wrap="none" rtlCol="0">
+            <a:spAutoFit/>
+          </a:bodyPr>
+          <a:lstStyle/>
+          <a:p>
+            <a:r>
+              <a:rPr lang="en-US" altLang="ja-JP" dirty="0" smtClean="0"/>
+              <a:t>release/</a:t>
+            </a:r>
+            <a:endParaRPr kumimoji="1" lang="ja-JP" altLang="en-US" dirty="0"/>
+          </a:p>
+        </p:txBody>
+      </p:sp>
+      <p:cxnSp>
+        <p:nvCxnSpPr>
+          <p:cNvPr id="16" name="カギ線コネクタ 15"/>
+          <p:cNvCxnSpPr>
+            <a:endCxn id="14" idx="1"/>
+          </p:cNvCxnSpPr>
+          <p:nvPr/>
+        </p:nvCxnSpPr>
+        <p:spPr>
+          <a:xfrm rot="16200000" flipH="1">
+            <a:off x="1676677" y="2180178"/>
+            <a:ext cx="321678" cy="271450"/>
+          </a:xfrm>
+          <a:prstGeom prst="bentConnector2">
+            <a:avLst/>
+          </a:prstGeom>
+        </p:spPr>
+        <p:style>
+          <a:lnRef idx="1">
+            <a:schemeClr val="dk1"/>
+          </a:lnRef>
+          <a:fillRef idx="0">
+            <a:schemeClr val="dk1"/>
+          </a:fillRef>
+          <a:effectRef idx="0">
+            <a:schemeClr val="dk1"/>
+          </a:effectRef>
+          <a:fontRef idx="minor">
+            <a:schemeClr val="tx1"/>
+          </a:fontRef>
+        </p:style>
+      </p:cxnSp>
+      <p:pic>
+        <p:nvPicPr>
+          <p:cNvPr id="20" name="図 19"/>
+          <p:cNvPicPr>
+            <a:picLocks noChangeAspect="1"/>
+          </p:cNvPicPr>
+          <p:nvPr/>
+        </p:nvPicPr>
+        <p:blipFill>
+          <a:blip r:embed="rId2" cstate="print">
+            <a:extLst>
+              <a:ext uri="{28A0092B-C50C-407E-A947-70E740481C1C}">
+                <a14:useLocalDpi xmlns:a14="http://schemas.microsoft.com/office/drawing/2010/main" val="0"/>
+              </a:ext>
+            </a:extLst>
+          </a:blip>
+          <a:stretch>
+            <a:fillRect/>
+          </a:stretch>
+        </p:blipFill>
+        <p:spPr>
+          <a:xfrm>
+            <a:off x="2503528" y="2724380"/>
+            <a:ext cx="475374" cy="475374"/>
+          </a:xfrm>
+          <a:prstGeom prst="rect">
+            <a:avLst/>
+          </a:prstGeom>
+        </p:spPr>
+      </p:pic>
+      <p:sp>
+        <p:nvSpPr>
+          <p:cNvPr id="21" name="テキスト ボックス 20"/>
+          <p:cNvSpPr txBox="1"/>
+          <p:nvPr/>
+        </p:nvSpPr>
+        <p:spPr>
+          <a:xfrm>
+            <a:off x="2978902" y="2777401"/>
+            <a:ext cx="670376" cy="369332"/>
+          </a:xfrm>
+          <a:prstGeom prst="rect">
+            <a:avLst/>
+          </a:prstGeom>
+          <a:noFill/>
+        </p:spPr>
+        <p:txBody>
+          <a:bodyPr wrap="none" rtlCol="0">
+            <a:spAutoFit/>
+          </a:bodyPr>
+          <a:lstStyle/>
+          <a:p>
+            <a:r>
+              <a:rPr lang="en-US" altLang="ja-JP" dirty="0" smtClean="0"/>
+              <a:t>v1.0/</a:t>
+            </a:r>
+            <a:endParaRPr kumimoji="1" lang="ja-JP" altLang="en-US" dirty="0"/>
+          </a:p>
+        </p:txBody>
+      </p:sp>
+      <p:cxnSp>
+        <p:nvCxnSpPr>
+          <p:cNvPr id="22" name="カギ線コネクタ 21"/>
+          <p:cNvCxnSpPr>
+            <a:stCxn id="14" idx="2"/>
+            <a:endCxn id="20" idx="1"/>
+          </p:cNvCxnSpPr>
+          <p:nvPr/>
+        </p:nvCxnSpPr>
+        <p:spPr>
+          <a:xfrm rot="16200000" flipH="1">
+            <a:off x="2233409" y="2691948"/>
+            <a:ext cx="247638" cy="292600"/>
+          </a:xfrm>
+          <a:prstGeom prst="bentConnector2">
+            <a:avLst/>
+          </a:prstGeom>
+        </p:spPr>
+        <p:style>
+          <a:lnRef idx="1">
+            <a:schemeClr val="dk1"/>
+          </a:lnRef>
+          <a:fillRef idx="0">
+            <a:schemeClr val="dk1"/>
+          </a:fillRef>
+          <a:effectRef idx="0">
+            <a:schemeClr val="dk1"/>
+          </a:effectRef>
+          <a:fontRef idx="minor">
+            <a:schemeClr val="tx1"/>
+          </a:fontRef>
+        </p:style>
+      </p:cxnSp>
+      <p:sp>
+        <p:nvSpPr>
+          <p:cNvPr id="26" name="正方形/長方形 25"/>
+          <p:cNvSpPr/>
+          <p:nvPr/>
+        </p:nvSpPr>
+        <p:spPr>
+          <a:xfrm>
+            <a:off x="5755162" y="1954703"/>
+            <a:ext cx="2523744" cy="2014728"/>
+          </a:xfrm>
+          <a:prstGeom prst="rect">
+            <a:avLst/>
+          </a:prstGeom>
+        </p:spPr>
+        <p:style>
+          <a:lnRef idx="1">
+            <a:schemeClr val="accent4"/>
+          </a:lnRef>
+          <a:fillRef idx="2">
+            <a:schemeClr val="accent4"/>
+          </a:fillRef>
+          <a:effectRef idx="1">
+            <a:schemeClr val="accent4"/>
+          </a:effectRef>
+          <a:fontRef idx="minor">
+            <a:schemeClr val="dk1"/>
+          </a:fontRef>
+        </p:style>
+        <p:txBody>
+          <a:bodyPr rtlCol="0" anchor="ctr"/>
+          <a:lstStyle/>
+          <a:p>
+            <a:pPr algn="ctr"/>
+            <a:endParaRPr kumimoji="1" lang="ja-JP" altLang="en-US" dirty="0"/>
+          </a:p>
+        </p:txBody>
+      </p:sp>
+      <p:pic>
+        <p:nvPicPr>
+          <p:cNvPr id="27" name="図 26"/>
+          <p:cNvPicPr>
+            <a:picLocks noChangeAspect="1"/>
+          </p:cNvPicPr>
+          <p:nvPr/>
+        </p:nvPicPr>
+        <p:blipFill>
+          <a:blip r:embed="rId2" cstate="print">
+            <a:extLst>
+              <a:ext uri="{28A0092B-C50C-407E-A947-70E740481C1C}">
+                <a14:useLocalDpi xmlns:a14="http://schemas.microsoft.com/office/drawing/2010/main" val="0"/>
+              </a:ext>
+            </a:extLst>
+          </a:blip>
+          <a:stretch>
+            <a:fillRect/>
+          </a:stretch>
+        </p:blipFill>
+        <p:spPr>
+          <a:xfrm>
+            <a:off x="5969965" y="2195552"/>
+            <a:ext cx="475374" cy="475374"/>
+          </a:xfrm>
+          <a:prstGeom prst="rect">
+            <a:avLst/>
+          </a:prstGeom>
+        </p:spPr>
+      </p:pic>
+      <p:sp>
+        <p:nvSpPr>
+          <p:cNvPr id="28" name="テキスト ボックス 27"/>
+          <p:cNvSpPr txBox="1"/>
+          <p:nvPr/>
+        </p:nvSpPr>
+        <p:spPr>
+          <a:xfrm>
+            <a:off x="6445339" y="2248573"/>
+            <a:ext cx="1350434" cy="369332"/>
+          </a:xfrm>
+          <a:prstGeom prst="rect">
+            <a:avLst/>
+          </a:prstGeom>
+          <a:noFill/>
+        </p:spPr>
+        <p:txBody>
+          <a:bodyPr wrap="none" rtlCol="0">
+            <a:spAutoFit/>
+          </a:bodyPr>
+          <a:lstStyle/>
+          <a:p>
+            <a:r>
+              <a:rPr lang="en-US" altLang="ja-JP" dirty="0" smtClean="0"/>
+              <a:t>d</a:t>
+            </a:r>
+            <a:r>
+              <a:rPr lang="en-US" altLang="ja-JP" dirty="0" smtClean="0"/>
+              <a:t>:\exportdir</a:t>
+            </a:r>
+            <a:endParaRPr kumimoji="1" lang="ja-JP" altLang="en-US" dirty="0"/>
+          </a:p>
+        </p:txBody>
+      </p:sp>
+      <p:pic>
+        <p:nvPicPr>
+          <p:cNvPr id="29" name="図 28"/>
+          <p:cNvPicPr>
+            <a:picLocks noChangeAspect="1"/>
+          </p:cNvPicPr>
+          <p:nvPr/>
+        </p:nvPicPr>
+        <p:blipFill>
+          <a:blip r:embed="rId2" cstate="print">
+            <a:extLst>
+              <a:ext uri="{28A0092B-C50C-407E-A947-70E740481C1C}">
+                <a14:useLocalDpi xmlns:a14="http://schemas.microsoft.com/office/drawing/2010/main" val="0"/>
+              </a:ext>
+            </a:extLst>
+          </a:blip>
+          <a:stretch>
+            <a:fillRect/>
+          </a:stretch>
+        </p:blipFill>
+        <p:spPr>
+          <a:xfrm>
+            <a:off x="6347917" y="2831776"/>
+            <a:ext cx="475374" cy="475374"/>
+          </a:xfrm>
+          <a:prstGeom prst="rect">
+            <a:avLst/>
+          </a:prstGeom>
+        </p:spPr>
+      </p:pic>
+      <p:sp>
+        <p:nvSpPr>
+          <p:cNvPr id="30" name="テキスト ボックス 29"/>
+          <p:cNvSpPr txBox="1"/>
+          <p:nvPr/>
+        </p:nvSpPr>
+        <p:spPr>
+          <a:xfrm>
+            <a:off x="6823291" y="2884797"/>
+            <a:ext cx="643125" cy="369332"/>
+          </a:xfrm>
+          <a:prstGeom prst="rect">
+            <a:avLst/>
+          </a:prstGeom>
+          <a:noFill/>
+        </p:spPr>
+        <p:txBody>
+          <a:bodyPr wrap="none" rtlCol="0">
+            <a:spAutoFit/>
+          </a:bodyPr>
+          <a:lstStyle/>
+          <a:p>
+            <a:r>
+              <a:rPr lang="en-US" altLang="ja-JP" dirty="0" smtClean="0"/>
+              <a:t>\doc</a:t>
+            </a:r>
+            <a:endParaRPr kumimoji="1" lang="ja-JP" altLang="en-US" dirty="0"/>
+          </a:p>
+        </p:txBody>
+      </p:sp>
+      <p:pic>
+        <p:nvPicPr>
+          <p:cNvPr id="31" name="図 30"/>
+          <p:cNvPicPr>
+            <a:picLocks noChangeAspect="1"/>
+          </p:cNvPicPr>
+          <p:nvPr/>
+        </p:nvPicPr>
+        <p:blipFill>
+          <a:blip r:embed="rId2" cstate="print">
+            <a:extLst>
+              <a:ext uri="{28A0092B-C50C-407E-A947-70E740481C1C}">
+                <a14:useLocalDpi xmlns:a14="http://schemas.microsoft.com/office/drawing/2010/main" val="0"/>
+              </a:ext>
+            </a:extLst>
+          </a:blip>
+          <a:stretch>
+            <a:fillRect/>
+          </a:stretch>
+        </p:blipFill>
+        <p:spPr>
+          <a:xfrm>
+            <a:off x="6347917" y="3363333"/>
+            <a:ext cx="475374" cy="475374"/>
+          </a:xfrm>
+          <a:prstGeom prst="rect">
+            <a:avLst/>
+          </a:prstGeom>
+        </p:spPr>
+      </p:pic>
+      <p:sp>
+        <p:nvSpPr>
+          <p:cNvPr id="32" name="テキスト ボックス 31"/>
+          <p:cNvSpPr txBox="1"/>
+          <p:nvPr/>
+        </p:nvSpPr>
+        <p:spPr>
+          <a:xfrm>
+            <a:off x="6823291" y="3416354"/>
+            <a:ext cx="565989" cy="369332"/>
+          </a:xfrm>
+          <a:prstGeom prst="rect">
+            <a:avLst/>
+          </a:prstGeom>
+          <a:noFill/>
+        </p:spPr>
+        <p:txBody>
+          <a:bodyPr wrap="none" rtlCol="0">
+            <a:spAutoFit/>
+          </a:bodyPr>
+          <a:lstStyle/>
+          <a:p>
+            <a:r>
+              <a:rPr lang="en-US" altLang="ja-JP" dirty="0" smtClean="0"/>
+              <a:t>\</a:t>
+            </a:r>
+            <a:r>
+              <a:rPr lang="en-US" altLang="ja-JP" dirty="0" err="1" smtClean="0"/>
+              <a:t>src</a:t>
+            </a:r>
+            <a:endParaRPr kumimoji="1" lang="ja-JP" altLang="en-US" dirty="0"/>
+          </a:p>
+        </p:txBody>
+      </p:sp>
+      <p:cxnSp>
+        <p:nvCxnSpPr>
+          <p:cNvPr id="33" name="カギ線コネクタ 32"/>
+          <p:cNvCxnSpPr>
+            <a:stCxn id="27" idx="2"/>
+            <a:endCxn id="29" idx="1"/>
+          </p:cNvCxnSpPr>
+          <p:nvPr/>
+        </p:nvCxnSpPr>
+        <p:spPr>
+          <a:xfrm rot="16200000" flipH="1">
+            <a:off x="6078516" y="2800061"/>
+            <a:ext cx="398537" cy="140265"/>
+          </a:xfrm>
+          <a:prstGeom prst="bentConnector2">
+            <a:avLst/>
+          </a:prstGeom>
+        </p:spPr>
+        <p:style>
+          <a:lnRef idx="1">
+            <a:schemeClr val="dk1"/>
+          </a:lnRef>
+          <a:fillRef idx="0">
+            <a:schemeClr val="dk1"/>
+          </a:fillRef>
+          <a:effectRef idx="0">
+            <a:schemeClr val="dk1"/>
+          </a:effectRef>
+          <a:fontRef idx="minor">
+            <a:schemeClr val="tx1"/>
+          </a:fontRef>
+        </p:style>
+      </p:cxnSp>
+      <p:cxnSp>
+        <p:nvCxnSpPr>
+          <p:cNvPr id="34" name="カギ線コネクタ 33"/>
+          <p:cNvCxnSpPr>
+            <a:endCxn id="31" idx="1"/>
+          </p:cNvCxnSpPr>
+          <p:nvPr/>
+        </p:nvCxnSpPr>
+        <p:spPr>
+          <a:xfrm rot="16200000" flipH="1">
+            <a:off x="5840829" y="3093931"/>
+            <a:ext cx="873911" cy="140265"/>
+          </a:xfrm>
+          <a:prstGeom prst="bentConnector2">
+            <a:avLst/>
+          </a:prstGeom>
+        </p:spPr>
+        <p:style>
+          <a:lnRef idx="1">
+            <a:schemeClr val="dk1"/>
+          </a:lnRef>
+          <a:fillRef idx="0">
+            <a:schemeClr val="dk1"/>
+          </a:fillRef>
+          <a:effectRef idx="0">
+            <a:schemeClr val="dk1"/>
+          </a:effectRef>
+          <a:fontRef idx="minor">
+            <a:schemeClr val="tx1"/>
+          </a:fontRef>
+        </p:style>
+      </p:cxnSp>
+      <p:sp>
+        <p:nvSpPr>
+          <p:cNvPr id="2" name="右矢印 1"/>
+          <p:cNvSpPr/>
+          <p:nvPr/>
+        </p:nvSpPr>
+        <p:spPr>
+          <a:xfrm>
+            <a:off x="3824173" y="2617904"/>
+            <a:ext cx="1711254" cy="886697"/>
+          </a:xfrm>
+          <a:prstGeom prst="rightArrow">
+            <a:avLst/>
+          </a:prstGeom>
+        </p:spPr>
+        <p:style>
+          <a:lnRef idx="2">
+            <a:schemeClr val="dk1"/>
+          </a:lnRef>
+          <a:fillRef idx="1">
+            <a:schemeClr val="lt1"/>
+          </a:fillRef>
+          <a:effectRef idx="0">
+            <a:schemeClr val="dk1"/>
+          </a:effectRef>
+          <a:fontRef idx="minor">
+            <a:schemeClr val="dk1"/>
+          </a:fontRef>
+        </p:style>
+        <p:txBody>
+          <a:bodyPr rtlCol="0" anchor="ctr"/>
+          <a:lstStyle/>
+          <a:p>
+            <a:pPr algn="ctr"/>
+            <a:r>
+              <a:rPr kumimoji="1" lang="ja-JP" altLang="en-US" dirty="0" smtClean="0"/>
+              <a:t>エクスポート</a:t>
+            </a:r>
+            <a:endParaRPr kumimoji="1" lang="ja-JP" altLang="en-US" dirty="0"/>
+          </a:p>
+        </p:txBody>
+      </p:sp>
+    </p:spTree>
+    <p:extLst>
+      <p:ext uri="{BB962C8B-B14F-4D97-AF65-F5344CB8AC3E}">
+        <p14:creationId xmlns:p14="http://schemas.microsoft.com/office/powerpoint/2010/main" val="2523038983"/>
+      </p:ext>
+    </p:extLst>
+  </p:cSld>
+  <p:clrMapOvr>
+    <a:masterClrMapping/>
+  </p:clrMapOvr>
+</p:sld>
+</file>
+
+<file path=ppt/slides/slide8.xml><?xml version="1.0" encoding="utf-8"?>
+<p:sld xmlns:a="http://schemas.openxmlformats.org/drawingml/2006/main" xmlns:r="http://schemas.openxmlformats.org/officeDocument/2006/relationships" xmlns:p="http://schemas.openxmlformats.org/presentationml/2006/main">
+  <p:cSld>
+    <p:spTree>
+      <p:nvGrpSpPr>
+        <p:cNvPr id="1" name=""/>
+        <p:cNvGrpSpPr/>
+        <p:nvPr/>
+      </p:nvGrpSpPr>
+      <p:grpSpPr>
+        <a:xfrm>
+          <a:off x="0" y="0"/>
+          <a:ext cx="0" cy="0"/>
+          <a:chOff x="0" y="0"/>
+          <a:chExt cx="0" cy="0"/>
+        </a:xfrm>
+      </p:grpSpPr>
+      <p:pic>
+        <p:nvPicPr>
+          <p:cNvPr id="2" name="図 1"/>
+          <p:cNvPicPr>
+            <a:picLocks noChangeAspect="1"/>
+          </p:cNvPicPr>
+          <p:nvPr/>
+        </p:nvPicPr>
+        <p:blipFill>
+          <a:blip r:embed="rId2"/>
+          <a:stretch>
+            <a:fillRect/>
+          </a:stretch>
+        </p:blipFill>
+        <p:spPr>
+          <a:xfrm>
+            <a:off x="2105333" y="2209952"/>
+            <a:ext cx="4933333" cy="2438095"/>
+          </a:xfrm>
+          <a:prstGeom prst="rect">
+            <a:avLst/>
+          </a:prstGeom>
+        </p:spPr>
+      </p:pic>
+    </p:spTree>
+    <p:extLst>
+      <p:ext uri="{BB962C8B-B14F-4D97-AF65-F5344CB8AC3E}">
+        <p14:creationId xmlns:p14="http://schemas.microsoft.com/office/powerpoint/2010/main" val="2392957564"/>
+      </p:ext>
+    </p:extLst>
+  </p:cSld>
+  <p:clrMapOvr>
+    <a:masterClrMapping/>
+  </p:clrMapOvr>
+</p:sld>
+</file>
+
+<file path=ppt/slides/slide9.xml><?xml version="1.0" encoding="utf-8"?>
+<p:sld xmlns:a="http://schemas.openxmlformats.org/drawingml/2006/main" xmlns:r="http://schemas.openxmlformats.org/officeDocument/2006/relationships" xmlns:p="http://schemas.openxmlformats.org/presentationml/2006/main">
+  <p:cSld>
+    <p:spTree>
+      <p:nvGrpSpPr>
+        <p:cNvPr id="1" name=""/>
+        <p:cNvGrpSpPr/>
+        <p:nvPr/>
+      </p:nvGrpSpPr>
+      <p:grpSpPr>
+        <a:xfrm>
+          <a:off x="0" y="0"/>
+          <a:ext cx="0" cy="0"/>
+          <a:chOff x="0" y="0"/>
+          <a:chExt cx="0" cy="0"/>
+        </a:xfrm>
+      </p:grpSpPr>
+      <p:pic>
+        <p:nvPicPr>
+          <p:cNvPr id="2" name="図 1"/>
+          <p:cNvPicPr>
+            <a:picLocks noChangeAspect="1"/>
+          </p:cNvPicPr>
+          <p:nvPr/>
+        </p:nvPicPr>
+        <p:blipFill>
+          <a:blip r:embed="rId2"/>
+          <a:stretch>
+            <a:fillRect/>
+          </a:stretch>
+        </p:blipFill>
+        <p:spPr>
+          <a:xfrm>
+            <a:off x="2343150" y="1624012"/>
+            <a:ext cx="4457700" cy="3609975"/>
+          </a:xfrm>
+          <a:prstGeom prst="rect">
+            <a:avLst/>
+          </a:prstGeom>
+        </p:spPr>
+      </p:pic>
+    </p:spTree>
+    <p:extLst>
+      <p:ext uri="{BB962C8B-B14F-4D97-AF65-F5344CB8AC3E}">
+        <p14:creationId xmlns:p14="http://schemas.microsoft.com/office/powerpoint/2010/main" val="72049"/>
       </p:ext>
     </p:extLst>
   </p:cSld>

</xml_diff>